<commit_message>
Phase 5 Complete: Insert flowcharts and build Premium Packs page
Flowchart Insertions (5 artifacts updated):
- ✅ Market Entry Playbook (s5)
- ✅ SWOT Analysis Pack (s2)
- ✅ Business Model Canvas (s1)
- ✅ CHAT Framework (s6) - NEW
- ✅ Levels of Work (h6) - NEW

All artifacts re-packaged and uploaded to CDN with updated URLs in seed.js.

Premium Packs Marketplace Page:
- Created src/pages/Packs.tsx with 4 curated packs
- Strategy Essentials Pack (R499)
- Cash Flow Mastery Pack (R399)
- People & Leadership Pack (R449)
- Compliance Bundle (R349)

Features:
- Displays all premium artifacts
- Shows pack savings (up to R200)
- Links to individual artifact detail pages
- Responsive grid layout
- CTA for personalized assessment

Replaced placeholder /packs route in App.tsx.
</commit_message>
<xml_diff>
--- a/artifacts/04-CHAT-Framework-Presentation.pptx
+++ b/artifacts/04-CHAT-Framework-Presentation.pptx
@@ -8,6 +8,7 @@
     <p:sldId id="256" r:id="rId7"/>
     <p:sldId id="257" r:id="rId8"/>
     <p:sldId id="258" r:id="rId9"/>
+    <p:sldId id="268" r:id="rId19"/>
     <p:sldId id="259" r:id="rId10"/>
     <p:sldId id="260" r:id="rId11"/>
     <p:sldId id="261" r:id="rId12"/>
@@ -3787,6 +3788,83 @@
           </a:p>
         </p:txBody>
       </p:sp>
+    </p:spTree>
+  </p:cSld>
+  <p:clrMapOvr>
+    <a:masterClrMapping/>
+  </p:clrMapOvr>
+</p:sld>
+</file>
+
+<file path=ppt/slides/slide13.xml><?xml version="1.0" encoding="utf-8"?>
+<p:sld xmlns:a="http://schemas.openxmlformats.org/drawingml/2006/main" xmlns:p="http://schemas.openxmlformats.org/presentationml/2006/main" xmlns:r="http://schemas.openxmlformats.org/officeDocument/2006/relationships">
+  <p:cSld>
+    <p:spTree>
+      <p:nvGrpSpPr>
+        <p:cNvPr id="1" name=""/>
+        <p:cNvGrpSpPr/>
+        <p:nvPr/>
+      </p:nvGrpSpPr>
+      <p:grpSpPr/>
+      <p:sp>
+        <p:nvSpPr>
+          <p:cNvPr id="2" name="TextBox 1"/>
+          <p:cNvSpPr txBox="1"/>
+          <p:nvPr/>
+        </p:nvSpPr>
+        <p:spPr>
+          <a:xfrm>
+            <a:off x="457200" y="274320"/>
+            <a:ext cx="8229600" cy="640080"/>
+          </a:xfrm>
+          <a:prstGeom prst="rect">
+            <a:avLst/>
+          </a:prstGeom>
+          <a:noFill/>
+        </p:spPr>
+        <p:txBody>
+          <a:bodyPr wrap="none">
+            <a:spAutoFit/>
+          </a:bodyPr>
+          <a:lstStyle/>
+          <a:p>
+            <a:pPr algn="ctr">
+              <a:defRPr sz="3000" b="1">
+                <a:solidFill>
+                  <a:srgbClr val="1C2A4A"/>
+                </a:solidFill>
+              </a:defRPr>
+            </a:pPr>
+            <a:r>
+              <a:t>The 7 Interconnected Components</a:t>
+            </a:r>
+          </a:p>
+        </p:txBody>
+      </p:sp>
+      <p:pic>
+        <p:nvPicPr>
+          <p:cNvPr id="3" name="Picture 2" descr="chat-framework-7-components.png"/>
+          <p:cNvPicPr>
+            <a:picLocks noChangeAspect="1"/>
+          </p:cNvPicPr>
+          <p:nvPr/>
+        </p:nvPicPr>
+        <p:blipFill>
+          <a:blip r:embed="rId2"/>
+          <a:stretch>
+            <a:fillRect/>
+          </a:stretch>
+        </p:blipFill>
+        <p:spPr>
+          <a:xfrm>
+            <a:off x="274320" y="1005840"/>
+            <a:ext cx="8595360" cy="5600414"/>
+          </a:xfrm>
+          <a:prstGeom prst="rect">
+            <a:avLst/>
+          </a:prstGeom>
+        </p:spPr>
+      </p:pic>
     </p:spTree>
   </p:cSld>
   <p:clrMapOvr>

</xml_diff>